<commit_message>
Added characteristics of Go
</commit_message>
<xml_diff>
--- a/learning-go.pptx
+++ b/learning-go.pptx
@@ -11,7 +11,20 @@
     <p:sldId id="259" r:id="rId5"/>
     <p:sldId id="260" r:id="rId6"/>
     <p:sldId id="261" r:id="rId7"/>
-    <p:sldId id="262" r:id="rId8"/>
+    <p:sldId id="263" r:id="rId8"/>
+    <p:sldId id="264" r:id="rId9"/>
+    <p:sldId id="265" r:id="rId10"/>
+    <p:sldId id="266" r:id="rId11"/>
+    <p:sldId id="268" r:id="rId12"/>
+    <p:sldId id="269" r:id="rId13"/>
+    <p:sldId id="270" r:id="rId14"/>
+    <p:sldId id="271" r:id="rId15"/>
+    <p:sldId id="272" r:id="rId16"/>
+    <p:sldId id="273" r:id="rId17"/>
+    <p:sldId id="274" r:id="rId18"/>
+    <p:sldId id="275" r:id="rId19"/>
+    <p:sldId id="262" r:id="rId20"/>
+    <p:sldId id="267" r:id="rId21"/>
   </p:sldIdLst>
   <p:sldSz cx="12192000" cy="6858000"/>
   <p:notesSz cx="6858000" cy="9144000"/>
@@ -7697,6 +7710,1472 @@
 </p:sld>
 </file>
 
+<file path=ppt/slides/slide10.xml><?xml version="1.0" encoding="utf-8"?>
+<p:sld xmlns:a="http://schemas.openxmlformats.org/drawingml/2006/main" xmlns:r="http://schemas.openxmlformats.org/officeDocument/2006/relationships" xmlns:p="http://schemas.openxmlformats.org/presentationml/2006/main">
+  <p:cSld>
+    <p:spTree>
+      <p:nvGrpSpPr>
+        <p:cNvPr id="1" name=""/>
+        <p:cNvGrpSpPr/>
+        <p:nvPr/>
+      </p:nvGrpSpPr>
+      <p:grpSpPr>
+        <a:xfrm>
+          <a:off x="0" y="0"/>
+          <a:ext cx="0" cy="0"/>
+          <a:chOff x="0" y="0"/>
+          <a:chExt cx="0" cy="0"/>
+        </a:xfrm>
+      </p:grpSpPr>
+      <p:sp>
+        <p:nvSpPr>
+          <p:cNvPr id="2" name="Titre 1"/>
+          <p:cNvSpPr>
+            <a:spLocks noGrp="1"/>
+          </p:cNvSpPr>
+          <p:nvPr>
+            <p:ph type="title"/>
+          </p:nvPr>
+        </p:nvSpPr>
+        <p:spPr/>
+        <p:txBody>
+          <a:bodyPr/>
+          <a:lstStyle/>
+          <a:p>
+            <a:r>
+              <a:rPr lang="fr-FR" dirty="0" smtClean="0"/>
+              <a:t>Caractéristiques : Concurrence</a:t>
+            </a:r>
+            <a:endParaRPr lang="fr-FR" dirty="0"/>
+          </a:p>
+        </p:txBody>
+      </p:sp>
+      <p:sp>
+        <p:nvSpPr>
+          <p:cNvPr id="3" name="Espace réservé du contenu 2"/>
+          <p:cNvSpPr>
+            <a:spLocks noGrp="1"/>
+          </p:cNvSpPr>
+          <p:nvPr>
+            <p:ph idx="1"/>
+          </p:nvPr>
+        </p:nvSpPr>
+        <p:spPr/>
+        <p:txBody>
+          <a:bodyPr anchor="ctr">
+            <a:normAutofit/>
+          </a:bodyPr>
+          <a:lstStyle/>
+          <a:p>
+            <a:pPr algn="just"/>
+            <a:r>
+              <a:rPr lang="fr-FR" dirty="0"/>
+              <a:t>Le langage Go a été créé pour la programmation système et a depuis été étendu aux applications, ce qui constitue la même cible que le C et surtout le C++. Il s'agit d'un langage impératif et </a:t>
+            </a:r>
+            <a:r>
+              <a:rPr lang="fr-FR" dirty="0" smtClean="0"/>
+              <a:t>concurrent</a:t>
+            </a:r>
+          </a:p>
+          <a:p>
+            <a:pPr algn="just"/>
+            <a:r>
+              <a:rPr lang="fr-FR" dirty="0" smtClean="0"/>
+              <a:t>Go intègre directement les traitements de code en concurrence (goroutine)</a:t>
+            </a:r>
+          </a:p>
+          <a:p>
+            <a:pPr algn="just"/>
+            <a:r>
+              <a:rPr lang="fr-FR" dirty="0"/>
+              <a:t>Le programme prendra alors avantage de la topologie de l'ordinateur pour exécuter au mieux les goroutines, pas forcément dans un nouveau thread, mais il est aussi possible qu'un groupe de goroutines soit multiplexé sur un groupe de </a:t>
+            </a:r>
+            <a:r>
+              <a:rPr lang="fr-FR" dirty="0" smtClean="0"/>
+              <a:t>threads</a:t>
+            </a:r>
+            <a:endParaRPr lang="fr-FR" dirty="0"/>
+          </a:p>
+        </p:txBody>
+      </p:sp>
+    </p:spTree>
+    <p:extLst>
+      <p:ext uri="{BB962C8B-B14F-4D97-AF65-F5344CB8AC3E}">
+        <p14:creationId xmlns:p14="http://schemas.microsoft.com/office/powerpoint/2010/main" val="195996940"/>
+      </p:ext>
+    </p:extLst>
+  </p:cSld>
+  <p:clrMapOvr>
+    <a:masterClrMapping/>
+  </p:clrMapOvr>
+  <p:timing>
+    <p:tnLst>
+      <p:par>
+        <p:cTn id="1" dur="indefinite" restart="never" nodeType="tmRoot"/>
+      </p:par>
+    </p:tnLst>
+  </p:timing>
+</p:sld>
+</file>
+
+<file path=ppt/slides/slide11.xml><?xml version="1.0" encoding="utf-8"?>
+<p:sld xmlns:a="http://schemas.openxmlformats.org/drawingml/2006/main" xmlns:r="http://schemas.openxmlformats.org/officeDocument/2006/relationships" xmlns:p="http://schemas.openxmlformats.org/presentationml/2006/main">
+  <p:cSld>
+    <p:spTree>
+      <p:nvGrpSpPr>
+        <p:cNvPr id="1" name=""/>
+        <p:cNvGrpSpPr/>
+        <p:nvPr/>
+      </p:nvGrpSpPr>
+      <p:grpSpPr>
+        <a:xfrm>
+          <a:off x="0" y="0"/>
+          <a:ext cx="0" cy="0"/>
+          <a:chOff x="0" y="0"/>
+          <a:chExt cx="0" cy="0"/>
+        </a:xfrm>
+      </p:grpSpPr>
+      <p:sp>
+        <p:nvSpPr>
+          <p:cNvPr id="2" name="Titre 1"/>
+          <p:cNvSpPr>
+            <a:spLocks noGrp="1"/>
+          </p:cNvSpPr>
+          <p:nvPr>
+            <p:ph type="title"/>
+          </p:nvPr>
+        </p:nvSpPr>
+        <p:spPr/>
+        <p:txBody>
+          <a:bodyPr/>
+          <a:lstStyle/>
+          <a:p>
+            <a:r>
+              <a:rPr lang="fr-FR" dirty="0" smtClean="0"/>
+              <a:t>Caractéristiques : Concurrence</a:t>
+            </a:r>
+            <a:endParaRPr lang="fr-FR" dirty="0"/>
+          </a:p>
+        </p:txBody>
+      </p:sp>
+      <p:sp>
+        <p:nvSpPr>
+          <p:cNvPr id="3" name="Espace réservé du contenu 2"/>
+          <p:cNvSpPr>
+            <a:spLocks noGrp="1"/>
+          </p:cNvSpPr>
+          <p:nvPr>
+            <p:ph idx="1"/>
+          </p:nvPr>
+        </p:nvSpPr>
+        <p:spPr/>
+        <p:txBody>
+          <a:bodyPr anchor="ctr">
+            <a:normAutofit/>
+          </a:bodyPr>
+          <a:lstStyle/>
+          <a:p>
+            <a:pPr algn="just"/>
+            <a:r>
+              <a:rPr lang="fr-FR" dirty="0"/>
+              <a:t>Pour appeler une fonction </a:t>
+            </a:r>
+            <a:r>
+              <a:rPr lang="fr-FR" b="1" dirty="0"/>
+              <a:t>f</a:t>
+            </a:r>
+            <a:r>
+              <a:rPr lang="fr-FR" dirty="0"/>
+              <a:t>, on écrit </a:t>
+            </a:r>
+            <a:r>
+              <a:rPr lang="fr-FR" b="1" dirty="0"/>
+              <a:t>f</a:t>
+            </a:r>
+            <a:r>
+              <a:rPr lang="fr-FR" b="1" dirty="0" smtClean="0"/>
+              <a:t>()</a:t>
+            </a:r>
+            <a:endParaRPr lang="fr-FR" dirty="0" smtClean="0"/>
+          </a:p>
+          <a:p>
+            <a:pPr algn="just"/>
+            <a:r>
+              <a:rPr lang="fr-FR" dirty="0" smtClean="0"/>
+              <a:t>Pour </a:t>
+            </a:r>
+            <a:r>
+              <a:rPr lang="fr-FR" dirty="0"/>
+              <a:t>l'appeler en tant que goroutine, on écrit simplement </a:t>
+            </a:r>
+            <a:r>
+              <a:rPr lang="fr-FR" b="1" dirty="0"/>
+              <a:t>go f()</a:t>
+            </a:r>
+            <a:r>
+              <a:rPr lang="fr-FR" dirty="0"/>
+              <a:t>, ce qui est très semblable au </a:t>
+            </a:r>
+            <a:r>
+              <a:rPr lang="fr-FR" i="1" dirty="0"/>
+              <a:t>call </a:t>
+            </a:r>
+            <a:r>
+              <a:rPr lang="fr-FR" b="1" i="1" dirty="0"/>
+              <a:t>f</a:t>
+            </a:r>
+            <a:r>
+              <a:rPr lang="fr-FR" i="1" dirty="0"/>
+              <a:t> task;</a:t>
+            </a:r>
+            <a:r>
+              <a:rPr lang="fr-FR" dirty="0"/>
+              <a:t> de PL/I ; langage gérant également le multitâche depuis </a:t>
+            </a:r>
+            <a:r>
+              <a:rPr lang="fr-FR" dirty="0" smtClean="0"/>
+              <a:t>1970</a:t>
+            </a:r>
+            <a:endParaRPr lang="fr-FR" dirty="0"/>
+          </a:p>
+          <a:p>
+            <a:pPr algn="just"/>
+            <a:r>
+              <a:rPr lang="fr-FR" dirty="0"/>
+              <a:t>Les goroutines communiquent entre elles par passage de messages, en envoyant ou en recevant des messages sur des </a:t>
+            </a:r>
+            <a:r>
+              <a:rPr lang="fr-FR" dirty="0" smtClean="0"/>
+              <a:t>canaux</a:t>
+            </a:r>
+          </a:p>
+          <a:p>
+            <a:pPr algn="just"/>
+            <a:r>
+              <a:rPr lang="fr-FR" dirty="0"/>
+              <a:t>Ces messages synchronisent les goroutines entre elles, conformément au modèle CSP, considéré par les auteurs comme plus intuitif que le modèle </a:t>
+            </a:r>
+            <a:r>
+              <a:rPr lang="fr-FR" dirty="0" smtClean="0"/>
+              <a:t>multithreads </a:t>
+            </a:r>
+            <a:r>
+              <a:rPr lang="fr-FR" dirty="0"/>
+              <a:t>(avec synchronisation par sémaphores comportant des verrous, notion introduite aussi elle-même par Dijkstra)</a:t>
+            </a:r>
+          </a:p>
+        </p:txBody>
+      </p:sp>
+    </p:spTree>
+    <p:extLst>
+      <p:ext uri="{BB962C8B-B14F-4D97-AF65-F5344CB8AC3E}">
+        <p14:creationId xmlns:p14="http://schemas.microsoft.com/office/powerpoint/2010/main" val="2073082992"/>
+      </p:ext>
+    </p:extLst>
+  </p:cSld>
+  <p:clrMapOvr>
+    <a:masterClrMapping/>
+  </p:clrMapOvr>
+  <p:timing>
+    <p:tnLst>
+      <p:par>
+        <p:cTn id="1" dur="indefinite" restart="never" nodeType="tmRoot"/>
+      </p:par>
+    </p:tnLst>
+  </p:timing>
+</p:sld>
+</file>
+
+<file path=ppt/slides/slide12.xml><?xml version="1.0" encoding="utf-8"?>
+<p:sld xmlns:a="http://schemas.openxmlformats.org/drawingml/2006/main" xmlns:r="http://schemas.openxmlformats.org/officeDocument/2006/relationships" xmlns:p="http://schemas.openxmlformats.org/presentationml/2006/main">
+  <p:cSld>
+    <p:spTree>
+      <p:nvGrpSpPr>
+        <p:cNvPr id="1" name=""/>
+        <p:cNvGrpSpPr/>
+        <p:nvPr/>
+      </p:nvGrpSpPr>
+      <p:grpSpPr>
+        <a:xfrm>
+          <a:off x="0" y="0"/>
+          <a:ext cx="0" cy="0"/>
+          <a:chOff x="0" y="0"/>
+          <a:chExt cx="0" cy="0"/>
+        </a:xfrm>
+      </p:grpSpPr>
+      <p:sp>
+        <p:nvSpPr>
+          <p:cNvPr id="2" name="Titre 1"/>
+          <p:cNvSpPr>
+            <a:spLocks noGrp="1"/>
+          </p:cNvSpPr>
+          <p:nvPr>
+            <p:ph type="title"/>
+          </p:nvPr>
+        </p:nvSpPr>
+        <p:spPr/>
+        <p:txBody>
+          <a:bodyPr/>
+          <a:lstStyle/>
+          <a:p>
+            <a:r>
+              <a:rPr lang="fr-FR" dirty="0" smtClean="0"/>
+              <a:t>Caractéristiques : Système de types</a:t>
+            </a:r>
+            <a:endParaRPr lang="fr-FR" dirty="0"/>
+          </a:p>
+        </p:txBody>
+      </p:sp>
+      <p:sp>
+        <p:nvSpPr>
+          <p:cNvPr id="3" name="Espace réservé du contenu 2"/>
+          <p:cNvSpPr>
+            <a:spLocks noGrp="1"/>
+          </p:cNvSpPr>
+          <p:nvPr>
+            <p:ph idx="1"/>
+          </p:nvPr>
+        </p:nvSpPr>
+        <p:spPr/>
+        <p:txBody>
+          <a:bodyPr anchor="ctr">
+            <a:normAutofit/>
+          </a:bodyPr>
+          <a:lstStyle/>
+          <a:p>
+            <a:pPr algn="just"/>
+            <a:r>
+              <a:rPr lang="fr-FR" dirty="0"/>
+              <a:t>Go a un système de type statique, fortement typé, structurel et sûr, fondé sur </a:t>
+            </a:r>
+            <a:r>
+              <a:rPr lang="fr-FR" dirty="0" smtClean="0"/>
+              <a:t>l‘inférence </a:t>
+            </a:r>
+            <a:r>
+              <a:rPr lang="fr-FR" dirty="0"/>
+              <a:t>de types avec la possibilité d'utiliser un typage </a:t>
+            </a:r>
+            <a:r>
+              <a:rPr lang="fr-FR" dirty="0" smtClean="0"/>
+              <a:t>explicite</a:t>
+            </a:r>
+          </a:p>
+          <a:p>
+            <a:pPr algn="just"/>
+            <a:r>
+              <a:rPr lang="fr-FR" dirty="0"/>
+              <a:t>La compatibilité des types composés est fondée sur les propriétés plutôt que sur le nom. C'est-à-dire que deux types composés seront équivalents si leurs propriétés sont équivalentes : même nom pour la propriété et équivalence de type. C'est le typage </a:t>
+            </a:r>
+            <a:r>
+              <a:rPr lang="fr-FR" dirty="0" smtClean="0"/>
+              <a:t>structurel</a:t>
+            </a:r>
+          </a:p>
+        </p:txBody>
+      </p:sp>
+    </p:spTree>
+    <p:extLst>
+      <p:ext uri="{BB962C8B-B14F-4D97-AF65-F5344CB8AC3E}">
+        <p14:creationId xmlns:p14="http://schemas.microsoft.com/office/powerpoint/2010/main" val="1255492076"/>
+      </p:ext>
+    </p:extLst>
+  </p:cSld>
+  <p:clrMapOvr>
+    <a:masterClrMapping/>
+  </p:clrMapOvr>
+  <p:timing>
+    <p:tnLst>
+      <p:par>
+        <p:cTn id="1" dur="indefinite" restart="never" nodeType="tmRoot"/>
+      </p:par>
+    </p:tnLst>
+  </p:timing>
+</p:sld>
+</file>
+
+<file path=ppt/slides/slide13.xml><?xml version="1.0" encoding="utf-8"?>
+<p:sld xmlns:a="http://schemas.openxmlformats.org/drawingml/2006/main" xmlns:r="http://schemas.openxmlformats.org/officeDocument/2006/relationships" xmlns:p="http://schemas.openxmlformats.org/presentationml/2006/main">
+  <p:cSld>
+    <p:spTree>
+      <p:nvGrpSpPr>
+        <p:cNvPr id="1" name=""/>
+        <p:cNvGrpSpPr/>
+        <p:nvPr/>
+      </p:nvGrpSpPr>
+      <p:grpSpPr>
+        <a:xfrm>
+          <a:off x="0" y="0"/>
+          <a:ext cx="0" cy="0"/>
+          <a:chOff x="0" y="0"/>
+          <a:chExt cx="0" cy="0"/>
+        </a:xfrm>
+      </p:grpSpPr>
+      <p:sp>
+        <p:nvSpPr>
+          <p:cNvPr id="2" name="Titre 1"/>
+          <p:cNvSpPr>
+            <a:spLocks noGrp="1"/>
+          </p:cNvSpPr>
+          <p:nvPr>
+            <p:ph type="title"/>
+          </p:nvPr>
+        </p:nvSpPr>
+        <p:spPr/>
+        <p:txBody>
+          <a:bodyPr/>
+          <a:lstStyle/>
+          <a:p>
+            <a:r>
+              <a:rPr lang="fr-FR" dirty="0" smtClean="0"/>
+              <a:t>Caractéristiques : Système de types</a:t>
+            </a:r>
+            <a:endParaRPr lang="fr-FR" dirty="0"/>
+          </a:p>
+        </p:txBody>
+      </p:sp>
+      <p:sp>
+        <p:nvSpPr>
+          <p:cNvPr id="3" name="Espace réservé du contenu 2"/>
+          <p:cNvSpPr>
+            <a:spLocks noGrp="1"/>
+          </p:cNvSpPr>
+          <p:nvPr>
+            <p:ph idx="1"/>
+          </p:nvPr>
+        </p:nvSpPr>
+        <p:spPr/>
+        <p:txBody>
+          <a:bodyPr anchor="ctr">
+            <a:normAutofit/>
+          </a:bodyPr>
+          <a:lstStyle/>
+          <a:p>
+            <a:pPr algn="just"/>
+            <a:r>
+              <a:rPr lang="fr-FR" dirty="0"/>
+              <a:t>Cela a pour conséquence que le langage n'est pas objet au sens classique (soit avec classes, soit avec prototype), cependant les concepteurs du langage ont fait un choix plus original pour un langage </a:t>
+            </a:r>
+            <a:r>
+              <a:rPr lang="fr-FR" dirty="0" smtClean="0"/>
+              <a:t>statique</a:t>
+            </a:r>
+          </a:p>
+          <a:p>
+            <a:pPr algn="just"/>
+            <a:r>
+              <a:rPr lang="fr-FR" dirty="0" smtClean="0"/>
+              <a:t>Il </a:t>
+            </a:r>
+            <a:r>
+              <a:rPr lang="fr-FR" dirty="0"/>
+              <a:t>est possible de définir des interfaces portant des méthodes décrivant le comportement d'un objet (Il est aussi facilement possible de mélanger plusieurs interfaces en une </a:t>
+            </a:r>
+            <a:r>
+              <a:rPr lang="fr-FR" dirty="0" smtClean="0"/>
+              <a:t>seule)</a:t>
+            </a:r>
+          </a:p>
+          <a:p>
+            <a:pPr algn="just"/>
+            <a:r>
+              <a:rPr lang="fr-FR" dirty="0" smtClean="0"/>
+              <a:t>Les </a:t>
+            </a:r>
+            <a:r>
+              <a:rPr lang="fr-FR" dirty="0"/>
+              <a:t>fonctions Go peuvent déclarer accepter un argument de cette interface. Un objet déclarant toutes les méthodes de cette interface, avec la même signature, peut être passé en argument de cette </a:t>
+            </a:r>
+            <a:r>
+              <a:rPr lang="fr-FR" dirty="0" smtClean="0"/>
+              <a:t>méthode</a:t>
+            </a:r>
+          </a:p>
+          <a:p>
+            <a:pPr algn="just"/>
+            <a:r>
+              <a:rPr lang="fr-FR" dirty="0" smtClean="0"/>
+              <a:t>La </a:t>
+            </a:r>
+            <a:r>
+              <a:rPr lang="fr-FR" dirty="0"/>
+              <a:t>vérification du type est effectuée statiquement par le </a:t>
+            </a:r>
+            <a:r>
+              <a:rPr lang="fr-FR" dirty="0" smtClean="0"/>
+              <a:t>compilateur</a:t>
+            </a:r>
+          </a:p>
+        </p:txBody>
+      </p:sp>
+    </p:spTree>
+    <p:extLst>
+      <p:ext uri="{BB962C8B-B14F-4D97-AF65-F5344CB8AC3E}">
+        <p14:creationId xmlns:p14="http://schemas.microsoft.com/office/powerpoint/2010/main" val="2040807839"/>
+      </p:ext>
+    </p:extLst>
+  </p:cSld>
+  <p:clrMapOvr>
+    <a:masterClrMapping/>
+  </p:clrMapOvr>
+  <p:timing>
+    <p:tnLst>
+      <p:par>
+        <p:cTn id="1" dur="indefinite" restart="never" nodeType="tmRoot"/>
+      </p:par>
+    </p:tnLst>
+  </p:timing>
+</p:sld>
+</file>
+
+<file path=ppt/slides/slide14.xml><?xml version="1.0" encoding="utf-8"?>
+<p:sld xmlns:a="http://schemas.openxmlformats.org/drawingml/2006/main" xmlns:r="http://schemas.openxmlformats.org/officeDocument/2006/relationships" xmlns:p="http://schemas.openxmlformats.org/presentationml/2006/main">
+  <p:cSld>
+    <p:spTree>
+      <p:nvGrpSpPr>
+        <p:cNvPr id="1" name=""/>
+        <p:cNvGrpSpPr/>
+        <p:nvPr/>
+      </p:nvGrpSpPr>
+      <p:grpSpPr>
+        <a:xfrm>
+          <a:off x="0" y="0"/>
+          <a:ext cx="0" cy="0"/>
+          <a:chOff x="0" y="0"/>
+          <a:chExt cx="0" cy="0"/>
+        </a:xfrm>
+      </p:grpSpPr>
+      <p:sp>
+        <p:nvSpPr>
+          <p:cNvPr id="2" name="Titre 1"/>
+          <p:cNvSpPr>
+            <a:spLocks noGrp="1"/>
+          </p:cNvSpPr>
+          <p:nvPr>
+            <p:ph type="title"/>
+          </p:nvPr>
+        </p:nvSpPr>
+        <p:spPr/>
+        <p:txBody>
+          <a:bodyPr/>
+          <a:lstStyle/>
+          <a:p>
+            <a:r>
+              <a:rPr lang="fr-FR" dirty="0" smtClean="0"/>
+              <a:t>Caractéristiques : Système de types</a:t>
+            </a:r>
+            <a:endParaRPr lang="fr-FR" dirty="0"/>
+          </a:p>
+        </p:txBody>
+      </p:sp>
+      <p:sp>
+        <p:nvSpPr>
+          <p:cNvPr id="3" name="Espace réservé du contenu 2"/>
+          <p:cNvSpPr>
+            <a:spLocks noGrp="1"/>
+          </p:cNvSpPr>
+          <p:nvPr>
+            <p:ph idx="1"/>
+          </p:nvPr>
+        </p:nvSpPr>
+        <p:spPr/>
+        <p:txBody>
+          <a:bodyPr anchor="ctr">
+            <a:normAutofit/>
+          </a:bodyPr>
+          <a:lstStyle/>
+          <a:p>
+            <a:pPr algn="just"/>
+            <a:r>
+              <a:rPr lang="fr-FR" dirty="0"/>
+              <a:t>Le fait que Go ne soit pas objet au sens classique fait que Go n'a pas </a:t>
+            </a:r>
+            <a:r>
+              <a:rPr lang="fr-FR" dirty="0" smtClean="0"/>
+              <a:t>d'héritage de </a:t>
+            </a:r>
+            <a:r>
+              <a:rPr lang="fr-FR" dirty="0"/>
+              <a:t>type et pas de </a:t>
+            </a:r>
+            <a:r>
+              <a:rPr lang="fr-FR" dirty="0" smtClean="0"/>
+              <a:t>sous-classage</a:t>
+            </a:r>
+          </a:p>
+          <a:p>
+            <a:pPr algn="just"/>
+            <a:r>
+              <a:rPr lang="fr-FR" dirty="0" smtClean="0"/>
+              <a:t>Ceci </a:t>
+            </a:r>
+            <a:r>
+              <a:rPr lang="fr-FR" dirty="0"/>
+              <a:t>permet de contourner les problèmes posés par ces systèmes tels l'héritage multiple dans les langages qui le permettent (en C++ par exemple), ou l'héritage simple (en Java par </a:t>
+            </a:r>
+            <a:r>
+              <a:rPr lang="fr-FR" dirty="0" smtClean="0"/>
+              <a:t>exemple)</a:t>
+            </a:r>
+          </a:p>
+          <a:p>
+            <a:pPr algn="just"/>
+            <a:r>
+              <a:rPr lang="fr-FR" dirty="0" smtClean="0"/>
+              <a:t>Grâce </a:t>
+            </a:r>
+            <a:r>
+              <a:rPr lang="fr-FR" dirty="0"/>
+              <a:t>à l'équivalence de types fondée sur les propriétés, Go n'a pas besoin d'héritage de </a:t>
+            </a:r>
+            <a:r>
+              <a:rPr lang="fr-FR" dirty="0" smtClean="0"/>
+              <a:t>type</a:t>
+            </a:r>
+          </a:p>
+          <a:p>
+            <a:pPr algn="just"/>
+            <a:r>
+              <a:rPr lang="fr-FR" dirty="0" smtClean="0"/>
+              <a:t>Le </a:t>
+            </a:r>
+            <a:r>
+              <a:rPr lang="fr-FR" dirty="0"/>
+              <a:t>sous-classage est émulé par l'« embarquement de type ». Ceci permet de mélanger facilement deux bases de code conçues indépendamment, sans qu'elles aient besoin de partager des types communs.</a:t>
+            </a:r>
+            <a:endParaRPr lang="fr-FR" dirty="0" smtClean="0"/>
+          </a:p>
+        </p:txBody>
+      </p:sp>
+    </p:spTree>
+    <p:extLst>
+      <p:ext uri="{BB962C8B-B14F-4D97-AF65-F5344CB8AC3E}">
+        <p14:creationId xmlns:p14="http://schemas.microsoft.com/office/powerpoint/2010/main" val="321259887"/>
+      </p:ext>
+    </p:extLst>
+  </p:cSld>
+  <p:clrMapOvr>
+    <a:masterClrMapping/>
+  </p:clrMapOvr>
+  <p:timing>
+    <p:tnLst>
+      <p:par>
+        <p:cTn id="1" dur="indefinite" restart="never" nodeType="tmRoot"/>
+      </p:par>
+    </p:tnLst>
+  </p:timing>
+</p:sld>
+</file>
+
+<file path=ppt/slides/slide15.xml><?xml version="1.0" encoding="utf-8"?>
+<p:sld xmlns:a="http://schemas.openxmlformats.org/drawingml/2006/main" xmlns:r="http://schemas.openxmlformats.org/officeDocument/2006/relationships" xmlns:p="http://schemas.openxmlformats.org/presentationml/2006/main">
+  <p:cSld>
+    <p:spTree>
+      <p:nvGrpSpPr>
+        <p:cNvPr id="1" name=""/>
+        <p:cNvGrpSpPr/>
+        <p:nvPr/>
+      </p:nvGrpSpPr>
+      <p:grpSpPr>
+        <a:xfrm>
+          <a:off x="0" y="0"/>
+          <a:ext cx="0" cy="0"/>
+          <a:chOff x="0" y="0"/>
+          <a:chExt cx="0" cy="0"/>
+        </a:xfrm>
+      </p:grpSpPr>
+      <p:sp>
+        <p:nvSpPr>
+          <p:cNvPr id="2" name="Titre 1"/>
+          <p:cNvSpPr>
+            <a:spLocks noGrp="1"/>
+          </p:cNvSpPr>
+          <p:nvPr>
+            <p:ph type="title"/>
+          </p:nvPr>
+        </p:nvSpPr>
+        <p:spPr/>
+        <p:txBody>
+          <a:bodyPr/>
+          <a:lstStyle/>
+          <a:p>
+            <a:r>
+              <a:rPr lang="fr-FR" dirty="0" smtClean="0"/>
+              <a:t>Caractéristiques : Système de types</a:t>
+            </a:r>
+            <a:endParaRPr lang="fr-FR" dirty="0"/>
+          </a:p>
+        </p:txBody>
+      </p:sp>
+      <p:sp>
+        <p:nvSpPr>
+          <p:cNvPr id="3" name="Espace réservé du contenu 2"/>
+          <p:cNvSpPr>
+            <a:spLocks noGrp="1"/>
+          </p:cNvSpPr>
+          <p:nvPr>
+            <p:ph idx="1"/>
+          </p:nvPr>
+        </p:nvSpPr>
+        <p:spPr/>
+        <p:txBody>
+          <a:bodyPr anchor="ctr">
+            <a:normAutofit/>
+          </a:bodyPr>
+          <a:lstStyle/>
+          <a:p>
+            <a:pPr algn="just"/>
+            <a:r>
+              <a:rPr lang="fr-FR" dirty="0"/>
+              <a:t>La visibilité des structures, attributs, variables, constantes, méthodes, types de haut niveau et des fonctions hors de leur paquetage de déclaration est définie par la casse du premier caractère de leurs identificateurs.</a:t>
+            </a:r>
+            <a:endParaRPr lang="fr-FR" dirty="0" smtClean="0"/>
+          </a:p>
+        </p:txBody>
+      </p:sp>
+    </p:spTree>
+    <p:extLst>
+      <p:ext uri="{BB962C8B-B14F-4D97-AF65-F5344CB8AC3E}">
+        <p14:creationId xmlns:p14="http://schemas.microsoft.com/office/powerpoint/2010/main" val="553044072"/>
+      </p:ext>
+    </p:extLst>
+  </p:cSld>
+  <p:clrMapOvr>
+    <a:masterClrMapping/>
+  </p:clrMapOvr>
+  <p:timing>
+    <p:tnLst>
+      <p:par>
+        <p:cTn id="1" dur="indefinite" restart="never" nodeType="tmRoot"/>
+      </p:par>
+    </p:tnLst>
+  </p:timing>
+</p:sld>
+</file>
+
+<file path=ppt/slides/slide16.xml><?xml version="1.0" encoding="utf-8"?>
+<p:sld xmlns:a="http://schemas.openxmlformats.org/drawingml/2006/main" xmlns:r="http://schemas.openxmlformats.org/officeDocument/2006/relationships" xmlns:p="http://schemas.openxmlformats.org/presentationml/2006/main">
+  <p:cSld>
+    <p:spTree>
+      <p:nvGrpSpPr>
+        <p:cNvPr id="1" name=""/>
+        <p:cNvGrpSpPr/>
+        <p:nvPr/>
+      </p:nvGrpSpPr>
+      <p:grpSpPr>
+        <a:xfrm>
+          <a:off x="0" y="0"/>
+          <a:ext cx="0" cy="0"/>
+          <a:chOff x="0" y="0"/>
+          <a:chExt cx="0" cy="0"/>
+        </a:xfrm>
+      </p:grpSpPr>
+      <p:sp>
+        <p:nvSpPr>
+          <p:cNvPr id="2" name="Titre 1"/>
+          <p:cNvSpPr>
+            <a:spLocks noGrp="1"/>
+          </p:cNvSpPr>
+          <p:nvPr>
+            <p:ph type="title"/>
+          </p:nvPr>
+        </p:nvSpPr>
+        <p:spPr/>
+        <p:txBody>
+          <a:bodyPr/>
+          <a:lstStyle/>
+          <a:p>
+            <a:r>
+              <a:rPr lang="fr-FR" dirty="0" smtClean="0"/>
+              <a:t>Caractéristiques : Divers</a:t>
+            </a:r>
+            <a:endParaRPr lang="fr-FR" dirty="0"/>
+          </a:p>
+        </p:txBody>
+      </p:sp>
+      <p:sp>
+        <p:nvSpPr>
+          <p:cNvPr id="3" name="Espace réservé du contenu 2"/>
+          <p:cNvSpPr>
+            <a:spLocks noGrp="1"/>
+          </p:cNvSpPr>
+          <p:nvPr>
+            <p:ph idx="1"/>
+          </p:nvPr>
+        </p:nvSpPr>
+        <p:spPr/>
+        <p:txBody>
+          <a:bodyPr anchor="ctr">
+            <a:normAutofit/>
+          </a:bodyPr>
+          <a:lstStyle/>
+          <a:p>
+            <a:pPr algn="just"/>
+            <a:r>
+              <a:rPr lang="fr-FR" dirty="0"/>
+              <a:t>Dans Go, la gestion de la mémoire est laissée à un </a:t>
+            </a:r>
+            <a:r>
+              <a:rPr lang="fr-FR" dirty="0" smtClean="0"/>
+              <a:t>ramasse-miettes</a:t>
+            </a:r>
+          </a:p>
+          <a:p>
+            <a:pPr algn="just"/>
+            <a:r>
+              <a:rPr lang="fr-FR" dirty="0"/>
+              <a:t>l n'y a pas encore de programmation générique même si les concepteurs du langage y </a:t>
+            </a:r>
+            <a:r>
+              <a:rPr lang="fr-FR" dirty="0" smtClean="0"/>
+              <a:t>réfléchissent</a:t>
+            </a:r>
+          </a:p>
+          <a:p>
+            <a:pPr algn="just"/>
+            <a:r>
+              <a:rPr lang="fr-FR" dirty="0" smtClean="0"/>
+              <a:t>Il </a:t>
+            </a:r>
+            <a:r>
+              <a:rPr lang="fr-FR" dirty="0"/>
+              <a:t>n'y a pas de surcharge de méthodes ou d'arithmétique des pointeurs</a:t>
+            </a:r>
+            <a:r>
+              <a:rPr lang="fr-FR" dirty="0" smtClean="0"/>
+              <a:t>.</a:t>
+            </a:r>
+          </a:p>
+          <a:p>
+            <a:pPr algn="just"/>
+            <a:r>
+              <a:rPr lang="fr-FR" dirty="0" smtClean="0"/>
+              <a:t>Enfin</a:t>
+            </a:r>
+            <a:r>
+              <a:rPr lang="fr-FR" dirty="0"/>
+              <a:t>, il n'y a pas d'assertions ou </a:t>
+            </a:r>
+            <a:r>
+              <a:rPr lang="fr-FR" dirty="0" smtClean="0"/>
+              <a:t>d'exceptions</a:t>
+            </a:r>
+          </a:p>
+          <a:p>
+            <a:pPr algn="just"/>
+            <a:r>
+              <a:rPr lang="fr-FR" dirty="0" smtClean="0"/>
+              <a:t>Pour </a:t>
+            </a:r>
+            <a:r>
+              <a:rPr lang="fr-FR" dirty="0"/>
+              <a:t>remplacer ces deux derniers, Go fournit les mots clés defer, panic et recover13 qui donnent des mécanismes similaires aux systèmes de gestion des exceptions de langages tels que C++ et Java (mots clés </a:t>
+            </a:r>
+            <a:r>
+              <a:rPr lang="fr-FR" dirty="0" err="1"/>
+              <a:t>try</a:t>
+            </a:r>
+            <a:r>
+              <a:rPr lang="fr-FR" dirty="0"/>
+              <a:t>, catch, </a:t>
+            </a:r>
+            <a:r>
+              <a:rPr lang="fr-FR" dirty="0" err="1"/>
+              <a:t>finally</a:t>
+            </a:r>
+            <a:r>
+              <a:rPr lang="fr-FR" dirty="0"/>
+              <a:t> et </a:t>
+            </a:r>
+            <a:r>
+              <a:rPr lang="fr-FR" dirty="0" err="1"/>
+              <a:t>throw</a:t>
+            </a:r>
+            <a:r>
+              <a:rPr lang="fr-FR" dirty="0"/>
+              <a:t>).</a:t>
+            </a:r>
+            <a:endParaRPr lang="fr-FR" dirty="0" smtClean="0"/>
+          </a:p>
+        </p:txBody>
+      </p:sp>
+    </p:spTree>
+    <p:extLst>
+      <p:ext uri="{BB962C8B-B14F-4D97-AF65-F5344CB8AC3E}">
+        <p14:creationId xmlns:p14="http://schemas.microsoft.com/office/powerpoint/2010/main" val="1993472253"/>
+      </p:ext>
+    </p:extLst>
+  </p:cSld>
+  <p:clrMapOvr>
+    <a:masterClrMapping/>
+  </p:clrMapOvr>
+  <p:timing>
+    <p:tnLst>
+      <p:par>
+        <p:cTn id="1" dur="indefinite" restart="never" nodeType="tmRoot"/>
+      </p:par>
+    </p:tnLst>
+  </p:timing>
+</p:sld>
+</file>
+
+<file path=ppt/slides/slide17.xml><?xml version="1.0" encoding="utf-8"?>
+<p:sld xmlns:a="http://schemas.openxmlformats.org/drawingml/2006/main" xmlns:r="http://schemas.openxmlformats.org/officeDocument/2006/relationships" xmlns:p="http://schemas.openxmlformats.org/presentationml/2006/main">
+  <p:cSld>
+    <p:spTree>
+      <p:nvGrpSpPr>
+        <p:cNvPr id="1" name=""/>
+        <p:cNvGrpSpPr/>
+        <p:nvPr/>
+      </p:nvGrpSpPr>
+      <p:grpSpPr>
+        <a:xfrm>
+          <a:off x="0" y="0"/>
+          <a:ext cx="0" cy="0"/>
+          <a:chOff x="0" y="0"/>
+          <a:chExt cx="0" cy="0"/>
+        </a:xfrm>
+      </p:grpSpPr>
+      <p:sp>
+        <p:nvSpPr>
+          <p:cNvPr id="2" name="Titre 1"/>
+          <p:cNvSpPr>
+            <a:spLocks noGrp="1"/>
+          </p:cNvSpPr>
+          <p:nvPr>
+            <p:ph type="title"/>
+          </p:nvPr>
+        </p:nvSpPr>
+        <p:spPr/>
+        <p:txBody>
+          <a:bodyPr/>
+          <a:lstStyle/>
+          <a:p>
+            <a:r>
+              <a:rPr lang="fr-FR" dirty="0" smtClean="0"/>
+              <a:t>Caractéristiques : Divers</a:t>
+            </a:r>
+            <a:endParaRPr lang="fr-FR" dirty="0"/>
+          </a:p>
+        </p:txBody>
+      </p:sp>
+      <p:sp>
+        <p:nvSpPr>
+          <p:cNvPr id="3" name="Espace réservé du contenu 2"/>
+          <p:cNvSpPr>
+            <a:spLocks noGrp="1"/>
+          </p:cNvSpPr>
+          <p:nvPr>
+            <p:ph idx="1"/>
+          </p:nvPr>
+        </p:nvSpPr>
+        <p:spPr/>
+        <p:txBody>
+          <a:bodyPr anchor="ctr">
+            <a:normAutofit/>
+          </a:bodyPr>
+          <a:lstStyle/>
+          <a:p>
+            <a:pPr algn="just"/>
+            <a:r>
+              <a:rPr lang="fr-FR" dirty="0"/>
+              <a:t>Go peut s'interfacer avec des bibliothèques en C/C++, des développeurs tiers ayant déjà développé des bindings pour SDL et </a:t>
+            </a:r>
+            <a:r>
+              <a:rPr lang="fr-FR" dirty="0" smtClean="0"/>
+              <a:t>MySQL</a:t>
+            </a:r>
+          </a:p>
+          <a:p>
+            <a:pPr algn="just"/>
+            <a:r>
+              <a:rPr lang="fr-FR" dirty="0"/>
+              <a:t>Go définit un format de code standard (au niveau des indentations, et de la présentation des structures de contrôle) et fournit un outil pour l'appliquer (go fmt</a:t>
+            </a:r>
+            <a:r>
+              <a:rPr lang="fr-FR" dirty="0" smtClean="0"/>
+              <a:t>)</a:t>
+            </a:r>
+          </a:p>
+          <a:p>
+            <a:pPr algn="just"/>
+            <a:r>
+              <a:rPr lang="fr-FR" dirty="0"/>
+              <a:t>Go propose également un système de documentation à partir du code et un framework de </a:t>
+            </a:r>
+            <a:r>
+              <a:rPr lang="fr-FR" dirty="0" smtClean="0"/>
+              <a:t>test</a:t>
+            </a:r>
+          </a:p>
+          <a:p>
+            <a:pPr algn="just"/>
+            <a:r>
+              <a:rPr lang="fr-FR" dirty="0"/>
+              <a:t>L'unité de compilation de go est le package qui est représenté dans l'implémentation standard par un répertoire et les fichiers directement contenus dans ce </a:t>
+            </a:r>
+            <a:r>
+              <a:rPr lang="fr-FR" dirty="0" smtClean="0"/>
+              <a:t>répertoire</a:t>
+            </a:r>
+          </a:p>
+        </p:txBody>
+      </p:sp>
+    </p:spTree>
+    <p:extLst>
+      <p:ext uri="{BB962C8B-B14F-4D97-AF65-F5344CB8AC3E}">
+        <p14:creationId xmlns:p14="http://schemas.microsoft.com/office/powerpoint/2010/main" val="747110772"/>
+      </p:ext>
+    </p:extLst>
+  </p:cSld>
+  <p:clrMapOvr>
+    <a:masterClrMapping/>
+  </p:clrMapOvr>
+  <p:timing>
+    <p:tnLst>
+      <p:par>
+        <p:cTn id="1" dur="indefinite" restart="never" nodeType="tmRoot"/>
+      </p:par>
+    </p:tnLst>
+  </p:timing>
+</p:sld>
+</file>
+
+<file path=ppt/slides/slide18.xml><?xml version="1.0" encoding="utf-8"?>
+<p:sld xmlns:a="http://schemas.openxmlformats.org/drawingml/2006/main" xmlns:r="http://schemas.openxmlformats.org/officeDocument/2006/relationships" xmlns:p="http://schemas.openxmlformats.org/presentationml/2006/main">
+  <p:cSld>
+    <p:spTree>
+      <p:nvGrpSpPr>
+        <p:cNvPr id="1" name=""/>
+        <p:cNvGrpSpPr/>
+        <p:nvPr/>
+      </p:nvGrpSpPr>
+      <p:grpSpPr>
+        <a:xfrm>
+          <a:off x="0" y="0"/>
+          <a:ext cx="0" cy="0"/>
+          <a:chOff x="0" y="0"/>
+          <a:chExt cx="0" cy="0"/>
+        </a:xfrm>
+      </p:grpSpPr>
+      <p:sp>
+        <p:nvSpPr>
+          <p:cNvPr id="2" name="Titre 1"/>
+          <p:cNvSpPr>
+            <a:spLocks noGrp="1"/>
+          </p:cNvSpPr>
+          <p:nvPr>
+            <p:ph type="title"/>
+          </p:nvPr>
+        </p:nvSpPr>
+        <p:spPr/>
+        <p:txBody>
+          <a:bodyPr/>
+          <a:lstStyle/>
+          <a:p>
+            <a:r>
+              <a:rPr lang="fr-FR" dirty="0" smtClean="0"/>
+              <a:t>Caractéristiques : Divers</a:t>
+            </a:r>
+            <a:endParaRPr lang="fr-FR" dirty="0"/>
+          </a:p>
+        </p:txBody>
+      </p:sp>
+      <p:sp>
+        <p:nvSpPr>
+          <p:cNvPr id="3" name="Espace réservé du contenu 2"/>
+          <p:cNvSpPr>
+            <a:spLocks noGrp="1"/>
+          </p:cNvSpPr>
+          <p:nvPr>
+            <p:ph idx="1"/>
+          </p:nvPr>
+        </p:nvSpPr>
+        <p:spPr/>
+        <p:txBody>
+          <a:bodyPr anchor="ctr">
+            <a:normAutofit/>
+          </a:bodyPr>
+          <a:lstStyle/>
+          <a:p>
+            <a:pPr algn="just"/>
+            <a:r>
+              <a:rPr lang="fr-FR" dirty="0"/>
+              <a:t>L'import d'un package se fait par son chemin d'importation et peut préciser soit une bibliothèque standard, soit également des packages tiers installés dans des dépôts de sources distants (actuellement supporté : dépôt sous svn, git, mercurial et bazaar)</a:t>
+            </a:r>
+            <a:endParaRPr lang="fr-FR" dirty="0" smtClean="0"/>
+          </a:p>
+        </p:txBody>
+      </p:sp>
+    </p:spTree>
+    <p:extLst>
+      <p:ext uri="{BB962C8B-B14F-4D97-AF65-F5344CB8AC3E}">
+        <p14:creationId xmlns:p14="http://schemas.microsoft.com/office/powerpoint/2010/main" val="2220981644"/>
+      </p:ext>
+    </p:extLst>
+  </p:cSld>
+  <p:clrMapOvr>
+    <a:masterClrMapping/>
+  </p:clrMapOvr>
+  <p:timing>
+    <p:tnLst>
+      <p:par>
+        <p:cTn id="1" dur="indefinite" restart="never" nodeType="tmRoot"/>
+      </p:par>
+    </p:tnLst>
+  </p:timing>
+</p:sld>
+</file>
+
+<file path=ppt/slides/slide19.xml><?xml version="1.0" encoding="utf-8"?>
+<p:sld xmlns:a="http://schemas.openxmlformats.org/drawingml/2006/main" xmlns:r="http://schemas.openxmlformats.org/officeDocument/2006/relationships" xmlns:p="http://schemas.openxmlformats.org/presentationml/2006/main">
+  <p:cSld>
+    <p:spTree>
+      <p:nvGrpSpPr>
+        <p:cNvPr id="1" name=""/>
+        <p:cNvGrpSpPr/>
+        <p:nvPr/>
+      </p:nvGrpSpPr>
+      <p:grpSpPr>
+        <a:xfrm>
+          <a:off x="0" y="0"/>
+          <a:ext cx="0" cy="0"/>
+          <a:chOff x="0" y="0"/>
+          <a:chExt cx="0" cy="0"/>
+        </a:xfrm>
+      </p:grpSpPr>
+      <p:sp>
+        <p:nvSpPr>
+          <p:cNvPr id="2" name="Titre 1"/>
+          <p:cNvSpPr>
+            <a:spLocks noGrp="1"/>
+          </p:cNvSpPr>
+          <p:nvPr>
+            <p:ph type="title"/>
+          </p:nvPr>
+        </p:nvSpPr>
+        <p:spPr/>
+        <p:txBody>
+          <a:bodyPr/>
+          <a:lstStyle/>
+          <a:p>
+            <a:r>
+              <a:rPr lang="fr-FR" dirty="0" smtClean="0"/>
+              <a:t>Déclaration des variables</a:t>
+            </a:r>
+            <a:endParaRPr lang="fr-FR" dirty="0"/>
+          </a:p>
+        </p:txBody>
+      </p:sp>
+      <p:sp>
+        <p:nvSpPr>
+          <p:cNvPr id="3" name="Espace réservé du contenu 2"/>
+          <p:cNvSpPr>
+            <a:spLocks noGrp="1"/>
+          </p:cNvSpPr>
+          <p:nvPr>
+            <p:ph idx="1"/>
+          </p:nvPr>
+        </p:nvSpPr>
+        <p:spPr/>
+        <p:txBody>
+          <a:bodyPr anchor="ctr"/>
+          <a:lstStyle/>
+          <a:p>
+            <a:r>
+              <a:rPr lang="fr-FR" dirty="0" smtClean="0"/>
+              <a:t>Mot-clé : </a:t>
+            </a:r>
+            <a:r>
+              <a:rPr lang="fr-FR" b="1" dirty="0" smtClean="0">
+                <a:solidFill>
+                  <a:schemeClr val="accent6"/>
+                </a:solidFill>
+              </a:rPr>
+              <a:t>var </a:t>
+            </a:r>
+            <a:r>
+              <a:rPr lang="fr-FR" dirty="0" smtClean="0">
+                <a:solidFill>
+                  <a:schemeClr val="tx1"/>
+                </a:solidFill>
+              </a:rPr>
+              <a:t>(optionnel mais bonne pratique)</a:t>
+            </a:r>
+            <a:endParaRPr lang="fr-FR" b="1" dirty="0" smtClean="0">
+              <a:solidFill>
+                <a:schemeClr val="accent6"/>
+              </a:solidFill>
+            </a:endParaRPr>
+          </a:p>
+          <a:p>
+            <a:r>
+              <a:rPr lang="fr-FR" dirty="0" smtClean="0"/>
+              <a:t>Déclarations possibles :</a:t>
+            </a:r>
+          </a:p>
+          <a:p>
+            <a:pPr lvl="1"/>
+            <a:r>
+              <a:rPr lang="fr-FR" b="1" dirty="0" smtClean="0">
+                <a:solidFill>
+                  <a:schemeClr val="accent6"/>
+                </a:solidFill>
+              </a:rPr>
+              <a:t>var</a:t>
+            </a:r>
+            <a:r>
+              <a:rPr lang="fr-FR" dirty="0" smtClean="0"/>
+              <a:t> </a:t>
+            </a:r>
+            <a:r>
+              <a:rPr lang="fr-FR" i="1" dirty="0" smtClean="0"/>
+              <a:t>&lt;nomDeVariable&gt; &lt;type&gt;</a:t>
+            </a:r>
+          </a:p>
+          <a:p>
+            <a:pPr lvl="1"/>
+            <a:r>
+              <a:rPr lang="fr-FR" b="1" dirty="0">
+                <a:solidFill>
+                  <a:schemeClr val="accent6"/>
+                </a:solidFill>
+              </a:rPr>
+              <a:t>var</a:t>
+            </a:r>
+            <a:r>
+              <a:rPr lang="fr-FR" dirty="0"/>
+              <a:t> </a:t>
+            </a:r>
+            <a:r>
+              <a:rPr lang="fr-FR" i="1" dirty="0"/>
+              <a:t>&lt;nomDeVariable&gt; &lt;type</a:t>
+            </a:r>
+            <a:r>
+              <a:rPr lang="fr-FR" i="1" dirty="0" smtClean="0"/>
+              <a:t>&gt;</a:t>
+            </a:r>
+            <a:r>
+              <a:rPr lang="fr-FR" dirty="0" smtClean="0"/>
+              <a:t> </a:t>
+            </a:r>
+            <a:r>
+              <a:rPr lang="fr-FR" b="1" dirty="0" smtClean="0">
+                <a:solidFill>
+                  <a:schemeClr val="accent6"/>
+                </a:solidFill>
+              </a:rPr>
+              <a:t>=</a:t>
+            </a:r>
+            <a:r>
+              <a:rPr lang="fr-FR" dirty="0" smtClean="0"/>
+              <a:t> </a:t>
+            </a:r>
+            <a:r>
+              <a:rPr lang="fr-FR" i="1" dirty="0" smtClean="0"/>
+              <a:t>&lt;valeur&gt;</a:t>
+            </a:r>
+          </a:p>
+          <a:p>
+            <a:pPr lvl="1"/>
+            <a:r>
+              <a:rPr lang="fr-FR" i="1" dirty="0" smtClean="0"/>
+              <a:t>&lt;</a:t>
+            </a:r>
+            <a:r>
+              <a:rPr lang="fr-FR" i="1" dirty="0"/>
+              <a:t>nomDeVariable&gt; </a:t>
+            </a:r>
+            <a:r>
+              <a:rPr lang="fr-FR" b="1" dirty="0" smtClean="0">
+                <a:solidFill>
+                  <a:schemeClr val="accent6"/>
+                </a:solidFill>
+              </a:rPr>
+              <a:t>:=</a:t>
+            </a:r>
+            <a:r>
+              <a:rPr lang="fr-FR" dirty="0" smtClean="0"/>
+              <a:t> </a:t>
+            </a:r>
+            <a:r>
+              <a:rPr lang="fr-FR" i="1" dirty="0" smtClean="0"/>
+              <a:t>&lt;valeur&gt; </a:t>
+            </a:r>
+            <a:r>
+              <a:rPr lang="fr-FR" i="1" dirty="0" smtClean="0">
+                <a:solidFill>
+                  <a:schemeClr val="accent1">
+                    <a:lumMod val="40000"/>
+                    <a:lumOff val="60000"/>
+                  </a:schemeClr>
+                </a:solidFill>
+              </a:rPr>
+              <a:t>(le type de la variable dépend de la valeur)</a:t>
+            </a:r>
+          </a:p>
+          <a:p>
+            <a:r>
+              <a:rPr lang="fr-FR" dirty="0" smtClean="0"/>
+              <a:t>Exemples :</a:t>
+            </a:r>
+          </a:p>
+          <a:p>
+            <a:pPr lvl="1"/>
+            <a:r>
+              <a:rPr lang="fr-FR" b="1" dirty="0" smtClean="0">
+                <a:solidFill>
+                  <a:schemeClr val="accent6"/>
+                </a:solidFill>
+              </a:rPr>
+              <a:t>var</a:t>
+            </a:r>
+            <a:r>
+              <a:rPr lang="fr-FR" dirty="0" smtClean="0"/>
+              <a:t> </a:t>
+            </a:r>
+            <a:r>
+              <a:rPr lang="fr-FR" i="1" dirty="0" smtClean="0"/>
+              <a:t>a</a:t>
+            </a:r>
+            <a:r>
+              <a:rPr lang="fr-FR" dirty="0" smtClean="0"/>
+              <a:t> </a:t>
+            </a:r>
+            <a:r>
+              <a:rPr lang="fr-FR" b="1" dirty="0" smtClean="0">
+                <a:solidFill>
+                  <a:schemeClr val="accent6"/>
+                </a:solidFill>
+              </a:rPr>
+              <a:t>int8</a:t>
+            </a:r>
+          </a:p>
+          <a:p>
+            <a:pPr lvl="1"/>
+            <a:r>
+              <a:rPr lang="fr-FR" b="1" dirty="0">
+                <a:solidFill>
+                  <a:schemeClr val="accent6"/>
+                </a:solidFill>
+              </a:rPr>
+              <a:t>var</a:t>
+            </a:r>
+            <a:r>
+              <a:rPr lang="fr-FR" dirty="0"/>
+              <a:t> </a:t>
+            </a:r>
+            <a:r>
+              <a:rPr lang="fr-FR" i="1" dirty="0" smtClean="0"/>
+              <a:t>b</a:t>
+            </a:r>
+            <a:r>
+              <a:rPr lang="fr-FR" dirty="0" smtClean="0"/>
+              <a:t> </a:t>
+            </a:r>
+            <a:r>
+              <a:rPr lang="fr-FR" b="1" dirty="0" smtClean="0">
+                <a:solidFill>
+                  <a:schemeClr val="accent6"/>
+                </a:solidFill>
+              </a:rPr>
+              <a:t>string</a:t>
+            </a:r>
+            <a:r>
+              <a:rPr lang="fr-FR" b="1" dirty="0">
+                <a:solidFill>
+                  <a:schemeClr val="accent6"/>
+                </a:solidFill>
+              </a:rPr>
+              <a:t> </a:t>
+            </a:r>
+            <a:r>
+              <a:rPr lang="fr-FR" b="1" dirty="0" smtClean="0">
+                <a:solidFill>
+                  <a:schemeClr val="accent6"/>
+                </a:solidFill>
+              </a:rPr>
+              <a:t>= ″</a:t>
+            </a:r>
+            <a:r>
+              <a:rPr lang="fr-FR" b="1" dirty="0" smtClean="0">
+                <a:solidFill>
+                  <a:schemeClr val="tx1"/>
+                </a:solidFill>
+              </a:rPr>
+              <a:t>A string of caracters</a:t>
+            </a:r>
+            <a:r>
+              <a:rPr lang="fr-FR" b="1" dirty="0">
+                <a:solidFill>
+                  <a:schemeClr val="tx1"/>
+                </a:solidFill>
+              </a:rPr>
+              <a:t> </a:t>
+            </a:r>
+            <a:r>
+              <a:rPr lang="fr-FR" b="1" dirty="0">
+                <a:solidFill>
+                  <a:schemeClr val="accent6"/>
+                </a:solidFill>
+              </a:rPr>
+              <a:t>″</a:t>
+            </a:r>
+          </a:p>
+          <a:p>
+            <a:pPr lvl="1"/>
+            <a:r>
+              <a:rPr lang="fr-FR" i="1" dirty="0"/>
+              <a:t>c</a:t>
+            </a:r>
+            <a:r>
+              <a:rPr lang="fr-FR" dirty="0" smtClean="0"/>
+              <a:t> </a:t>
+            </a:r>
+            <a:r>
+              <a:rPr lang="fr-FR" b="1" dirty="0" smtClean="0">
+                <a:solidFill>
+                  <a:schemeClr val="accent6"/>
+                </a:solidFill>
+              </a:rPr>
+              <a:t>:=</a:t>
+            </a:r>
+            <a:r>
+              <a:rPr lang="fr-FR" dirty="0" smtClean="0"/>
+              <a:t> </a:t>
+            </a:r>
+            <a:r>
+              <a:rPr lang="fr-FR" i="1" dirty="0" smtClean="0"/>
+              <a:t>112</a:t>
+            </a:r>
+            <a:endParaRPr lang="fr-FR" b="1" i="1" dirty="0">
+              <a:solidFill>
+                <a:schemeClr val="accent6"/>
+              </a:solidFill>
+            </a:endParaRPr>
+          </a:p>
+        </p:txBody>
+      </p:sp>
+    </p:spTree>
+    <p:extLst>
+      <p:ext uri="{BB962C8B-B14F-4D97-AF65-F5344CB8AC3E}">
+        <p14:creationId xmlns:p14="http://schemas.microsoft.com/office/powerpoint/2010/main" val="714360546"/>
+      </p:ext>
+    </p:extLst>
+  </p:cSld>
+  <p:clrMapOvr>
+    <a:masterClrMapping/>
+  </p:clrMapOvr>
+  <p:timing>
+    <p:tnLst>
+      <p:par>
+        <p:cTn id="1" dur="indefinite" restart="never" nodeType="tmRoot"/>
+      </p:par>
+    </p:tnLst>
+  </p:timing>
+</p:sld>
+</file>
+
 <file path=ppt/slides/slide2.xml><?xml version="1.0" encoding="utf-8"?>
 <p:sld xmlns:a="http://schemas.openxmlformats.org/drawingml/2006/main" xmlns:r="http://schemas.openxmlformats.org/officeDocument/2006/relationships" xmlns:p="http://schemas.openxmlformats.org/presentationml/2006/main">
   <p:cSld>
@@ -7841,6 +9320,109 @@
       </p:par>
     </p:tnLst>
   </p:timing>
+</p:sld>
+</file>
+
+<file path=ppt/slides/slide20.xml><?xml version="1.0" encoding="utf-8"?>
+<p:sld xmlns:a="http://schemas.openxmlformats.org/drawingml/2006/main" xmlns:r="http://schemas.openxmlformats.org/officeDocument/2006/relationships" xmlns:p="http://schemas.openxmlformats.org/presentationml/2006/main">
+  <p:cSld>
+    <p:spTree>
+      <p:nvGrpSpPr>
+        <p:cNvPr id="1" name=""/>
+        <p:cNvGrpSpPr/>
+        <p:nvPr/>
+      </p:nvGrpSpPr>
+      <p:grpSpPr>
+        <a:xfrm>
+          <a:off x="0" y="0"/>
+          <a:ext cx="0" cy="0"/>
+          <a:chOff x="0" y="0"/>
+          <a:chExt cx="0" cy="0"/>
+        </a:xfrm>
+      </p:grpSpPr>
+      <p:sp>
+        <p:nvSpPr>
+          <p:cNvPr id="2" name="Titre 1"/>
+          <p:cNvSpPr>
+            <a:spLocks noGrp="1"/>
+          </p:cNvSpPr>
+          <p:nvPr>
+            <p:ph type="title"/>
+          </p:nvPr>
+        </p:nvSpPr>
+        <p:spPr/>
+        <p:txBody>
+          <a:bodyPr/>
+          <a:lstStyle/>
+          <a:p>
+            <a:r>
+              <a:rPr lang="fr-FR" dirty="0" smtClean="0"/>
+              <a:t>Références</a:t>
+            </a:r>
+            <a:endParaRPr lang="fr-FR" dirty="0"/>
+          </a:p>
+        </p:txBody>
+      </p:sp>
+      <p:sp>
+        <p:nvSpPr>
+          <p:cNvPr id="3" name="Espace réservé du contenu 2"/>
+          <p:cNvSpPr>
+            <a:spLocks noGrp="1"/>
+          </p:cNvSpPr>
+          <p:nvPr>
+            <p:ph idx="1"/>
+          </p:nvPr>
+        </p:nvSpPr>
+        <p:spPr/>
+        <p:txBody>
+          <a:bodyPr anchor="ctr"/>
+          <a:lstStyle/>
+          <a:p>
+            <a:r>
+              <a:rPr lang="fr-FR" dirty="0" smtClean="0"/>
+              <a:t>Golang Project : https</a:t>
+            </a:r>
+            <a:r>
+              <a:rPr lang="fr-FR" dirty="0"/>
+              <a:t>://golang.org</a:t>
+            </a:r>
+            <a:r>
+              <a:rPr lang="fr-FR" dirty="0" smtClean="0"/>
+              <a:t>/</a:t>
+            </a:r>
+          </a:p>
+          <a:p>
+            <a:r>
+              <a:rPr lang="fr-FR" dirty="0" smtClean="0"/>
+              <a:t>Didier Gérard : https</a:t>
+            </a:r>
+            <a:r>
+              <a:rPr lang="fr-FR" dirty="0"/>
+              <a:t>://lemag.sfeir.com/pourquoi-golang/</a:t>
+            </a:r>
+          </a:p>
+          <a:p>
+            <a:r>
+              <a:rPr lang="fr-FR" dirty="0" smtClean="0"/>
+              <a:t>Wikipédia : </a:t>
+            </a:r>
+            <a:r>
+              <a:rPr lang="fr-FR" dirty="0"/>
+              <a:t>https://fr.wikipedia.org/wiki/Go_(langage)</a:t>
+            </a:r>
+          </a:p>
+        </p:txBody>
+      </p:sp>
+    </p:spTree>
+    <p:extLst>
+      <p:ext uri="{BB962C8B-B14F-4D97-AF65-F5344CB8AC3E}">
+        <p14:creationId xmlns:p14="http://schemas.microsoft.com/office/powerpoint/2010/main" val="2478443664"/>
+      </p:ext>
+    </p:extLst>
+  </p:cSld>
+  <p:clrMapOvr>
+    <a:masterClrMapping/>
+  </p:clrMapOvr>
 </p:sld>
 </file>
 
@@ -8359,21 +9941,18 @@
           </a:bodyPr>
           <a:lstStyle/>
           <a:p>
+            <a:pPr algn="just"/>
             <a:r>
               <a:rPr lang="fr-FR" sz="1600" dirty="0"/>
-              <a:t>Cette liste de points cruciaux démontre que Golang est totalement en adéquation avec nos préoccupations </a:t>
-            </a:r>
-            <a:r>
-              <a:rPr lang="fr-FR" sz="1600"/>
-              <a:t>de </a:t>
-            </a:r>
-            <a:r>
-              <a:rPr lang="fr-FR" sz="1600" smtClean="0"/>
+              <a:t>Cette liste de points cruciaux démontre que Golang est totalement en adéquation avec nos préoccupations de </a:t>
+            </a:r>
+            <a:r>
+              <a:rPr lang="fr-FR" sz="1600" dirty="0" smtClean="0"/>
               <a:t>2017.</a:t>
             </a:r>
-            <a:endParaRPr lang="fr-FR" sz="1600" dirty="0" smtClean="0"/>
-          </a:p>
-          <a:p>
+          </a:p>
+          <a:p>
+            <a:pPr algn="just"/>
             <a:r>
               <a:rPr lang="fr-FR" sz="1600" dirty="0" smtClean="0"/>
               <a:t>Il </a:t>
@@ -8388,6 +9967,7 @@
             </a:r>
           </a:p>
           <a:p>
+            <a:pPr algn="just"/>
             <a:r>
               <a:rPr lang="fr-FR" sz="1600" dirty="0" smtClean="0"/>
               <a:t>Est-il </a:t>
@@ -8402,6 +9982,7 @@
             </a:r>
           </a:p>
           <a:p>
+            <a:pPr algn="just"/>
             <a:r>
               <a:rPr lang="fr-FR" sz="1600" dirty="0" smtClean="0"/>
               <a:t>Mais </a:t>
@@ -8416,6 +9997,7 @@
             </a:r>
           </a:p>
           <a:p>
+            <a:pPr algn="just"/>
             <a:r>
               <a:rPr lang="fr-FR" sz="1600" dirty="0" smtClean="0"/>
               <a:t>Il </a:t>
@@ -8482,7 +10064,7 @@
           <a:p>
             <a:r>
               <a:rPr lang="fr-FR" dirty="0" smtClean="0"/>
-              <a:t>Déclaration des variables</a:t>
+              <a:t>Golang ?</a:t>
             </a:r>
             <a:endParaRPr lang="fr-FR" dirty="0"/>
           </a:p>
@@ -8500,287 +10082,279 @@
         </p:nvSpPr>
         <p:spPr/>
         <p:txBody>
-          <a:bodyPr anchor="ctr"/>
-          <a:lstStyle/>
-          <a:p>
+          <a:bodyPr>
+            <a:normAutofit fontScale="92500" lnSpcReduction="10000"/>
+          </a:bodyPr>
+          <a:lstStyle/>
+          <a:p>
+            <a:pPr algn="just"/>
             <a:r>
               <a:rPr lang="fr-FR" dirty="0" smtClean="0"/>
-              <a:t>Mot-clé : </a:t>
-            </a:r>
-            <a:r>
-              <a:rPr lang="fr-FR" b="1" dirty="0" smtClean="0">
-                <a:solidFill>
-                  <a:schemeClr val="accent6"/>
-                </a:solidFill>
-              </a:rPr>
-              <a:t>var </a:t>
-            </a:r>
-            <a:r>
-              <a:rPr lang="fr-FR" dirty="0" smtClean="0">
-                <a:solidFill>
-                  <a:schemeClr val="tx1"/>
-                </a:solidFill>
-              </a:rPr>
-              <a:t>(optionnel mais bonne pratique)</a:t>
-            </a:r>
-            <a:endParaRPr lang="fr-FR" b="1" dirty="0" smtClean="0">
-              <a:solidFill>
-                <a:schemeClr val="accent6"/>
-              </a:solidFill>
-            </a:endParaRPr>
-          </a:p>
-          <a:p>
+              <a:t>Go est un langage compilé</a:t>
+            </a:r>
+          </a:p>
+          <a:p>
+            <a:pPr algn="just"/>
             <a:r>
               <a:rPr lang="fr-FR" dirty="0" smtClean="0"/>
-              <a:t>Déclarations possibles :</a:t>
-            </a:r>
-          </a:p>
-          <a:p>
-            <a:pPr lvl="1"/>
-            <a:r>
-              <a:rPr lang="fr-FR" b="1" dirty="0" smtClean="0">
-                <a:solidFill>
-                  <a:schemeClr val="accent6"/>
-                </a:solidFill>
-              </a:rPr>
-              <a:t>var</a:t>
-            </a:r>
+              <a:t>Inspiré de C et Pascal</a:t>
+            </a:r>
+          </a:p>
+          <a:p>
+            <a:pPr algn="just"/>
             <a:r>
               <a:rPr lang="fr-FR" dirty="0" smtClean="0"/>
-              <a:t> </a:t>
-            </a:r>
-            <a:r>
-              <a:rPr lang="fr-FR" i="1" dirty="0" smtClean="0"/>
-              <a:t>&lt;nomDeVariable&gt; &lt;type&gt;</a:t>
-            </a:r>
-          </a:p>
-          <a:p>
-            <a:pPr lvl="1"/>
-            <a:r>
-              <a:rPr lang="fr-FR" b="1" dirty="0">
-                <a:solidFill>
-                  <a:schemeClr val="accent6"/>
-                </a:solidFill>
-              </a:rPr>
-              <a:t>var</a:t>
-            </a:r>
+              <a:t>Développé par Google (Robert Griesemer, Rob Pike et Ken Thompson)</a:t>
+            </a:r>
+          </a:p>
+          <a:p>
+            <a:pPr algn="just"/>
+            <a:r>
+              <a:rPr lang="fr-FR" dirty="0" smtClean="0"/>
+              <a:t>Rob Pike à propos des jeunes développeurs :</a:t>
+            </a:r>
+          </a:p>
+          <a:p>
+            <a:pPr marL="457200" lvl="1" indent="0" algn="just">
+              <a:buNone/>
+            </a:pPr>
             <a:r>
               <a:rPr lang="fr-FR" dirty="0"/>
-              <a:t> </a:t>
-            </a:r>
-            <a:r>
-              <a:rPr lang="fr-FR" i="1" dirty="0"/>
-              <a:t>&lt;nomDeVariable&gt; &lt;type</a:t>
-            </a:r>
-            <a:r>
-              <a:rPr lang="fr-FR" i="1" dirty="0" smtClean="0"/>
-              <a:t>&gt;</a:t>
+              <a:t>« Ils ne sont pas capables de comprendre un langage brillant, mais nous voulons les amener à réaliser de bons programmes. Ainsi, le langage que nous leur donnons doit être </a:t>
             </a:r>
             <a:r>
               <a:rPr lang="fr-FR" dirty="0" smtClean="0"/>
-              <a:t> </a:t>
-            </a:r>
-            <a:r>
-              <a:rPr lang="fr-FR" b="1" dirty="0" smtClean="0">
-                <a:solidFill>
-                  <a:schemeClr val="accent6"/>
-                </a:solidFill>
-              </a:rPr>
-              <a:t>=</a:t>
+              <a:t>facile </a:t>
+            </a:r>
+            <a:r>
+              <a:rPr lang="fr-FR" dirty="0"/>
+              <a:t>à comprendre et facile à adopter </a:t>
             </a:r>
             <a:r>
               <a:rPr lang="fr-FR" dirty="0" smtClean="0"/>
-              <a:t> </a:t>
-            </a:r>
-            <a:r>
-              <a:rPr lang="fr-FR" i="1" dirty="0" smtClean="0"/>
-              <a:t>&lt;valeur&gt;</a:t>
-            </a:r>
-          </a:p>
-          <a:p>
-            <a:pPr lvl="1"/>
-            <a:r>
-              <a:rPr lang="fr-FR" i="1" dirty="0" smtClean="0"/>
-              <a:t>&lt;</a:t>
-            </a:r>
-            <a:r>
-              <a:rPr lang="fr-FR" i="1" dirty="0"/>
-              <a:t>nomDeVariable&gt; </a:t>
-            </a:r>
-            <a:r>
-              <a:rPr lang="fr-FR" b="1" dirty="0" smtClean="0">
-                <a:solidFill>
-                  <a:schemeClr val="accent6"/>
-                </a:solidFill>
-              </a:rPr>
-              <a:t>:=</a:t>
+              <a:t>»</a:t>
+            </a:r>
+            <a:endParaRPr lang="fr-FR" dirty="0"/>
+          </a:p>
+          <a:p>
+            <a:pPr algn="just"/>
+            <a:r>
+              <a:rPr lang="fr-FR" dirty="0"/>
+              <a:t>Go veut faciliter et accélérer la programmation à grande échelle : en raison de sa simplicité, sa compilation serait de 80 % à 90 % plus rapide que la compilation classique du </a:t>
             </a:r>
             <a:r>
               <a:rPr lang="fr-FR" dirty="0" smtClean="0"/>
-              <a:t> </a:t>
-            </a:r>
-            <a:r>
-              <a:rPr lang="fr-FR" i="1" dirty="0" smtClean="0"/>
-              <a:t>&lt;valeur&gt; </a:t>
-            </a:r>
-            <a:r>
-              <a:rPr lang="fr-FR" i="1" dirty="0" smtClean="0">
-                <a:solidFill>
-                  <a:schemeClr val="accent1">
-                    <a:lumMod val="40000"/>
-                    <a:lumOff val="60000"/>
-                  </a:schemeClr>
-                </a:solidFill>
-              </a:rPr>
-              <a:t>(le type de la variable dépend de la valeur)</a:t>
-            </a:r>
-          </a:p>
-          <a:p>
-            <a:r>
-              <a:rPr lang="fr-FR" dirty="0" smtClean="0"/>
-              <a:t>Exemples :</a:t>
-            </a:r>
-          </a:p>
-          <a:p>
-            <a:pPr lvl="1"/>
-            <a:r>
-              <a:rPr lang="fr-FR" b="1" dirty="0" smtClean="0">
-                <a:solidFill>
-                  <a:schemeClr val="accent6"/>
-                </a:solidFill>
-              </a:rPr>
-              <a:t>var</a:t>
-            </a:r>
-            <a:r>
-              <a:rPr lang="fr-FR" dirty="0" smtClean="0"/>
-              <a:t> </a:t>
-            </a:r>
-            <a:r>
-              <a:rPr lang="fr-FR" i="1" dirty="0" smtClean="0"/>
-              <a:t>a</a:t>
-            </a:r>
-            <a:r>
-              <a:rPr lang="fr-FR" dirty="0" smtClean="0"/>
-              <a:t> </a:t>
-            </a:r>
-            <a:r>
-              <a:rPr lang="fr-FR" b="1" dirty="0" smtClean="0">
-                <a:solidFill>
-                  <a:schemeClr val="accent6"/>
-                </a:solidFill>
-              </a:rPr>
-              <a:t>int8</a:t>
-            </a:r>
-          </a:p>
-          <a:p>
-            <a:pPr lvl="1"/>
-            <a:r>
-              <a:rPr lang="fr-FR" b="1" dirty="0">
-                <a:solidFill>
-                  <a:schemeClr val="accent6"/>
-                </a:solidFill>
-              </a:rPr>
-              <a:t>var</a:t>
+              <a:t>C, </a:t>
             </a:r>
             <a:r>
               <a:rPr lang="fr-FR" dirty="0"/>
-              <a:t> </a:t>
-            </a:r>
-            <a:r>
-              <a:rPr lang="fr-FR" i="1" dirty="0" smtClean="0"/>
-              <a:t>b</a:t>
-            </a:r>
-            <a:r>
-              <a:rPr lang="fr-FR" dirty="0" smtClean="0"/>
-              <a:t> </a:t>
-            </a:r>
-            <a:r>
-              <a:rPr lang="fr-FR" b="1" dirty="0" smtClean="0">
-                <a:solidFill>
-                  <a:schemeClr val="accent6"/>
-                </a:solidFill>
-              </a:rPr>
-              <a:t>string</a:t>
-            </a:r>
-            <a:r>
-              <a:rPr lang="fr-FR" b="1" dirty="0">
-                <a:solidFill>
-                  <a:schemeClr val="accent6"/>
-                </a:solidFill>
-              </a:rPr>
-              <a:t> </a:t>
-            </a:r>
-            <a:r>
-              <a:rPr lang="fr-FR" b="1" dirty="0" smtClean="0">
-                <a:solidFill>
-                  <a:schemeClr val="accent6"/>
-                </a:solidFill>
-              </a:rPr>
-              <a:t>= ″</a:t>
-            </a:r>
-            <a:r>
-              <a:rPr lang="fr-FR" b="1" dirty="0" smtClean="0">
-                <a:solidFill>
-                  <a:schemeClr val="tx1"/>
-                </a:solidFill>
-              </a:rPr>
-              <a:t>A string of caracters</a:t>
-            </a:r>
-            <a:r>
-              <a:rPr lang="fr-FR" b="1" dirty="0">
-                <a:solidFill>
-                  <a:schemeClr val="tx1"/>
-                </a:solidFill>
-              </a:rPr>
-              <a:t> </a:t>
-            </a:r>
-            <a:r>
-              <a:rPr lang="fr-FR" b="1" dirty="0">
-                <a:solidFill>
-                  <a:schemeClr val="accent6"/>
-                </a:solidFill>
-              </a:rPr>
-              <a:t>″</a:t>
-            </a:r>
-          </a:p>
-          <a:p>
-            <a:pPr lvl="1"/>
-            <a:r>
-              <a:rPr lang="fr-FR" i="1" dirty="0"/>
-              <a:t>c</a:t>
-            </a:r>
-            <a:r>
-              <a:rPr lang="fr-FR" dirty="0" smtClean="0"/>
-              <a:t> </a:t>
-            </a:r>
-            <a:r>
-              <a:rPr lang="fr-FR" b="1" dirty="0" smtClean="0">
-                <a:solidFill>
-                  <a:schemeClr val="accent6"/>
-                </a:solidFill>
-              </a:rPr>
-              <a:t>:=</a:t>
-            </a:r>
-            <a:r>
-              <a:rPr lang="fr-FR" dirty="0" smtClean="0"/>
-              <a:t> </a:t>
-            </a:r>
-            <a:r>
-              <a:rPr lang="fr-FR" i="1" dirty="0" smtClean="0"/>
-              <a:t>112</a:t>
-            </a:r>
-            <a:endParaRPr lang="fr-FR" b="1" i="1" dirty="0">
-              <a:solidFill>
-                <a:schemeClr val="accent6"/>
-              </a:solidFill>
-            </a:endParaRPr>
+              <a:t>et il est donc concevable de l'utiliser aussi bien pour écrire des applications, des scripts ou de grands systèmes. Cette simplicité est nécessaire aussi pour assurer la maintenance et l'évolution des programmes sur plusieurs générations de développeurs.</a:t>
+            </a:r>
           </a:p>
         </p:txBody>
       </p:sp>
     </p:spTree>
     <p:extLst>
       <p:ext uri="{BB962C8B-B14F-4D97-AF65-F5344CB8AC3E}">
-        <p14:creationId xmlns:p14="http://schemas.microsoft.com/office/powerpoint/2010/main" val="714360546"/>
+        <p14:creationId xmlns:p14="http://schemas.microsoft.com/office/powerpoint/2010/main" val="173054815"/>
+      </p:ext>
+    </p:extLst>
+  </p:cSld>
+  <p:clrMapOvr>
+    <a:masterClrMapping/>
+  </p:clrMapOvr>
+  <p:timing>
+    <p:tnLst>
+      <p:par>
+        <p:cTn id="1" dur="indefinite" restart="never" nodeType="tmRoot"/>
+      </p:par>
+    </p:tnLst>
+  </p:timing>
+</p:sld>
+</file>
+
+<file path=ppt/slides/slide8.xml><?xml version="1.0" encoding="utf-8"?>
+<p:sld xmlns:a="http://schemas.openxmlformats.org/drawingml/2006/main" xmlns:r="http://schemas.openxmlformats.org/officeDocument/2006/relationships" xmlns:p="http://schemas.openxmlformats.org/presentationml/2006/main">
+  <p:cSld>
+    <p:spTree>
+      <p:nvGrpSpPr>
+        <p:cNvPr id="1" name=""/>
+        <p:cNvGrpSpPr/>
+        <p:nvPr/>
+      </p:nvGrpSpPr>
+      <p:grpSpPr>
+        <a:xfrm>
+          <a:off x="0" y="0"/>
+          <a:ext cx="0" cy="0"/>
+          <a:chOff x="0" y="0"/>
+          <a:chExt cx="0" cy="0"/>
+        </a:xfrm>
+      </p:grpSpPr>
+      <p:sp>
+        <p:nvSpPr>
+          <p:cNvPr id="2" name="Titre 1"/>
+          <p:cNvSpPr>
+            <a:spLocks noGrp="1"/>
+          </p:cNvSpPr>
+          <p:nvPr>
+            <p:ph type="title"/>
+          </p:nvPr>
+        </p:nvSpPr>
+        <p:spPr/>
+        <p:txBody>
+          <a:bodyPr/>
+          <a:lstStyle/>
+          <a:p>
+            <a:r>
+              <a:rPr lang="fr-FR" dirty="0" smtClean="0"/>
+              <a:t>Golang ?</a:t>
+            </a:r>
+            <a:endParaRPr lang="fr-FR" dirty="0"/>
+          </a:p>
+        </p:txBody>
+      </p:sp>
+      <p:sp>
+        <p:nvSpPr>
+          <p:cNvPr id="3" name="Espace réservé du contenu 2"/>
+          <p:cNvSpPr>
+            <a:spLocks noGrp="1"/>
+          </p:cNvSpPr>
+          <p:nvPr>
+            <p:ph idx="1"/>
+          </p:nvPr>
+        </p:nvSpPr>
+        <p:spPr/>
+        <p:txBody>
+          <a:bodyPr anchor="ctr">
+            <a:normAutofit/>
+          </a:bodyPr>
+          <a:lstStyle/>
+          <a:p>
+            <a:pPr algn="just"/>
+            <a:r>
+              <a:rPr lang="fr-FR" dirty="0"/>
+              <a:t>S'il vise aussi la rapidité d'exécution, indispensable à la programmation système, il considère le multithreading comme le moyen le plus robuste d'assurer sur les processeurs actuels cette </a:t>
+            </a:r>
+            <a:r>
+              <a:rPr lang="fr-FR" dirty="0" smtClean="0"/>
+              <a:t>rapidité</a:t>
+            </a:r>
+            <a:r>
+              <a:rPr lang="fr-FR" dirty="0"/>
+              <a:t> tout en rendant la maintenance facile par séparation de tâches simples exécutées indépendamment afin d'éviter de créer des « usines à gaz </a:t>
+            </a:r>
+            <a:r>
+              <a:rPr lang="fr-FR" dirty="0" smtClean="0"/>
+              <a:t>».</a:t>
+            </a:r>
+          </a:p>
+          <a:p>
+            <a:pPr algn="just"/>
+            <a:r>
+              <a:rPr lang="fr-FR" dirty="0" smtClean="0"/>
+              <a:t>Cette </a:t>
+            </a:r>
+            <a:r>
+              <a:rPr lang="fr-FR" dirty="0"/>
+              <a:t>conception permet également le fonctionnement sans réécriture sur des architectures multi-cœurs en exploitant immédiatement l'augmentation de puissance correspondante</a:t>
+            </a:r>
+          </a:p>
+        </p:txBody>
+      </p:sp>
+    </p:spTree>
+    <p:extLst>
+      <p:ext uri="{BB962C8B-B14F-4D97-AF65-F5344CB8AC3E}">
+        <p14:creationId xmlns:p14="http://schemas.microsoft.com/office/powerpoint/2010/main" val="1875130607"/>
+      </p:ext>
+    </p:extLst>
+  </p:cSld>
+  <p:clrMapOvr>
+    <a:masterClrMapping/>
+  </p:clrMapOvr>
+  <p:timing>
+    <p:tnLst>
+      <p:par>
+        <p:cTn id="1" dur="indefinite" restart="never" nodeType="tmRoot"/>
+      </p:par>
+    </p:tnLst>
+  </p:timing>
+</p:sld>
+</file>
+
+<file path=ppt/slides/slide9.xml><?xml version="1.0" encoding="utf-8"?>
+<p:sld xmlns:a="http://schemas.openxmlformats.org/drawingml/2006/main" xmlns:r="http://schemas.openxmlformats.org/officeDocument/2006/relationships" xmlns:p="http://schemas.openxmlformats.org/presentationml/2006/main">
+  <p:cSld>
+    <p:spTree>
+      <p:nvGrpSpPr>
+        <p:cNvPr id="1" name=""/>
+        <p:cNvGrpSpPr/>
+        <p:nvPr/>
+      </p:nvGrpSpPr>
+      <p:grpSpPr>
+        <a:xfrm>
+          <a:off x="0" y="0"/>
+          <a:ext cx="0" cy="0"/>
+          <a:chOff x="0" y="0"/>
+          <a:chExt cx="0" cy="0"/>
+        </a:xfrm>
+      </p:grpSpPr>
+      <p:sp>
+        <p:nvSpPr>
+          <p:cNvPr id="2" name="Titre 1"/>
+          <p:cNvSpPr>
+            <a:spLocks noGrp="1"/>
+          </p:cNvSpPr>
+          <p:nvPr>
+            <p:ph type="title"/>
+          </p:nvPr>
+        </p:nvSpPr>
+        <p:spPr/>
+        <p:txBody>
+          <a:bodyPr/>
+          <a:lstStyle/>
+          <a:p>
+            <a:r>
+              <a:rPr lang="fr-FR" dirty="0" smtClean="0"/>
+              <a:t>Caractéristiques</a:t>
+            </a:r>
+            <a:endParaRPr lang="fr-FR" dirty="0"/>
+          </a:p>
+        </p:txBody>
+      </p:sp>
+      <p:sp>
+        <p:nvSpPr>
+          <p:cNvPr id="3" name="Espace réservé du contenu 2"/>
+          <p:cNvSpPr>
+            <a:spLocks noGrp="1"/>
+          </p:cNvSpPr>
+          <p:nvPr>
+            <p:ph idx="1"/>
+          </p:nvPr>
+        </p:nvSpPr>
+        <p:spPr/>
+        <p:txBody>
+          <a:bodyPr anchor="ctr">
+            <a:normAutofit/>
+          </a:bodyPr>
+          <a:lstStyle/>
+          <a:p>
+            <a:pPr algn="just"/>
+            <a:r>
+              <a:rPr lang="fr-FR" dirty="0"/>
+              <a:t>Le langage Go a été créé pour la programmation système et a depuis été étendu aux applications, ce qui constitue la même cible que le C et surtout le C++. Il s'agit d'un langage impératif et </a:t>
+            </a:r>
+            <a:r>
+              <a:rPr lang="fr-FR" dirty="0" smtClean="0"/>
+              <a:t>concurrent</a:t>
+            </a:r>
+            <a:endParaRPr lang="fr-FR" dirty="0"/>
+          </a:p>
+        </p:txBody>
+      </p:sp>
+    </p:spTree>
+    <p:extLst>
+      <p:ext uri="{BB962C8B-B14F-4D97-AF65-F5344CB8AC3E}">
+        <p14:creationId xmlns:p14="http://schemas.microsoft.com/office/powerpoint/2010/main" val="4230641785"/>
       </p:ext>
     </p:extLst>
   </p:cSld>

</xml_diff>